<commit_message>
Some pages working and some left
</commit_message>
<xml_diff>
--- a/wireframe.pptx
+++ b/wireframe.pptx
@@ -210,7 +210,7 @@
           <a:p>
             <a:fld id="{91770E75-3CB7-4288-83F8-5D7DA40F87D0}" type="datetimeFigureOut">
               <a:rPr lang="zh-HK" altLang="en-US" smtClean="0"/>
-              <a:t>6/7/2018</a:t>
+              <a:t>13/7/2018</a:t>
             </a:fld>
             <a:endParaRPr lang="zh-HK" altLang="en-US"/>
           </a:p>
@@ -627,7 +627,7 @@
           <a:p>
             <a:fld id="{B786544F-7616-4E76-B974-455D48E99084}" type="datetimeFigureOut">
               <a:rPr lang="zh-HK" altLang="en-US" smtClean="0"/>
-              <a:t>6/7/2018</a:t>
+              <a:t>13/7/2018</a:t>
             </a:fld>
             <a:endParaRPr lang="zh-HK" altLang="en-US"/>
           </a:p>
@@ -827,7 +827,7 @@
           <a:p>
             <a:fld id="{B786544F-7616-4E76-B974-455D48E99084}" type="datetimeFigureOut">
               <a:rPr lang="zh-HK" altLang="en-US" smtClean="0"/>
-              <a:t>6/7/2018</a:t>
+              <a:t>13/7/2018</a:t>
             </a:fld>
             <a:endParaRPr lang="zh-HK" altLang="en-US"/>
           </a:p>
@@ -1037,7 +1037,7 @@
           <a:p>
             <a:fld id="{B786544F-7616-4E76-B974-455D48E99084}" type="datetimeFigureOut">
               <a:rPr lang="zh-HK" altLang="en-US" smtClean="0"/>
-              <a:t>6/7/2018</a:t>
+              <a:t>13/7/2018</a:t>
             </a:fld>
             <a:endParaRPr lang="zh-HK" altLang="en-US"/>
           </a:p>
@@ -1237,7 +1237,7 @@
           <a:p>
             <a:fld id="{B786544F-7616-4E76-B974-455D48E99084}" type="datetimeFigureOut">
               <a:rPr lang="zh-HK" altLang="en-US" smtClean="0"/>
-              <a:t>6/7/2018</a:t>
+              <a:t>13/7/2018</a:t>
             </a:fld>
             <a:endParaRPr lang="zh-HK" altLang="en-US"/>
           </a:p>
@@ -1513,7 +1513,7 @@
           <a:p>
             <a:fld id="{B786544F-7616-4E76-B974-455D48E99084}" type="datetimeFigureOut">
               <a:rPr lang="zh-HK" altLang="en-US" smtClean="0"/>
-              <a:t>6/7/2018</a:t>
+              <a:t>13/7/2018</a:t>
             </a:fld>
             <a:endParaRPr lang="zh-HK" altLang="en-US"/>
           </a:p>
@@ -1781,7 +1781,7 @@
           <a:p>
             <a:fld id="{B786544F-7616-4E76-B974-455D48E99084}" type="datetimeFigureOut">
               <a:rPr lang="zh-HK" altLang="en-US" smtClean="0"/>
-              <a:t>6/7/2018</a:t>
+              <a:t>13/7/2018</a:t>
             </a:fld>
             <a:endParaRPr lang="zh-HK" altLang="en-US"/>
           </a:p>
@@ -2196,7 +2196,7 @@
           <a:p>
             <a:fld id="{B786544F-7616-4E76-B974-455D48E99084}" type="datetimeFigureOut">
               <a:rPr lang="zh-HK" altLang="en-US" smtClean="0"/>
-              <a:t>6/7/2018</a:t>
+              <a:t>13/7/2018</a:t>
             </a:fld>
             <a:endParaRPr lang="zh-HK" altLang="en-US"/>
           </a:p>
@@ -2338,7 +2338,7 @@
           <a:p>
             <a:fld id="{B786544F-7616-4E76-B974-455D48E99084}" type="datetimeFigureOut">
               <a:rPr lang="zh-HK" altLang="en-US" smtClean="0"/>
-              <a:t>6/7/2018</a:t>
+              <a:t>13/7/2018</a:t>
             </a:fld>
             <a:endParaRPr lang="zh-HK" altLang="en-US"/>
           </a:p>
@@ -2451,7 +2451,7 @@
           <a:p>
             <a:fld id="{B786544F-7616-4E76-B974-455D48E99084}" type="datetimeFigureOut">
               <a:rPr lang="zh-HK" altLang="en-US" smtClean="0"/>
-              <a:t>6/7/2018</a:t>
+              <a:t>13/7/2018</a:t>
             </a:fld>
             <a:endParaRPr lang="zh-HK" altLang="en-US"/>
           </a:p>
@@ -2764,7 +2764,7 @@
           <a:p>
             <a:fld id="{B786544F-7616-4E76-B974-455D48E99084}" type="datetimeFigureOut">
               <a:rPr lang="zh-HK" altLang="en-US" smtClean="0"/>
-              <a:t>6/7/2018</a:t>
+              <a:t>13/7/2018</a:t>
             </a:fld>
             <a:endParaRPr lang="zh-HK" altLang="en-US"/>
           </a:p>
@@ -3053,7 +3053,7 @@
           <a:p>
             <a:fld id="{B786544F-7616-4E76-B974-455D48E99084}" type="datetimeFigureOut">
               <a:rPr lang="zh-HK" altLang="en-US" smtClean="0"/>
-              <a:t>6/7/2018</a:t>
+              <a:t>13/7/2018</a:t>
             </a:fld>
             <a:endParaRPr lang="zh-HK" altLang="en-US"/>
           </a:p>
@@ -3296,7 +3296,7 @@
           <a:p>
             <a:fld id="{B786544F-7616-4E76-B974-455D48E99084}" type="datetimeFigureOut">
               <a:rPr lang="zh-HK" altLang="en-US" smtClean="0"/>
-              <a:t>6/7/2018</a:t>
+              <a:t>13/7/2018</a:t>
             </a:fld>
             <a:endParaRPr lang="zh-HK" altLang="en-US"/>
           </a:p>
@@ -4888,9 +4888,10 @@
           <a:lstStyle/>
           <a:p>
             <a:r>
-              <a:rPr lang="en-GB" altLang="zh-HK" u="sng" dirty="0"/>
+              <a:rPr lang="en-GB" altLang="zh-HK" u="sng"/>
               <a:t>Personal Info</a:t>
             </a:r>
+            <a:endParaRPr lang="en-GB" altLang="zh-HK" u="sng" dirty="0"/>
           </a:p>
           <a:p>
             <a:endParaRPr lang="en-GB" altLang="zh-HK" u="sng" dirty="0"/>

</xml_diff>